<commit_message>
Started data base prototyping
</commit_message>
<xml_diff>
--- a/docs/Presentation.pptx
+++ b/docs/Presentation.pptx
@@ -217,7 +217,7 @@
           <a:p>
             <a:fld id="{C750EDD8-39F8-D449-BB0F-7DE7A68CE7A4}" type="datetimeFigureOut">
               <a:rPr lang="ru-RU" smtClean="0"/>
-              <a:t>02.11.17</a:t>
+              <a:t>07.11.17</a:t>
             </a:fld>
             <a:endParaRPr lang="ru-RU"/>
           </a:p>
@@ -651,7 +651,7 @@
           <a:p>
             <a:fld id="{1D8BD707-D9CF-40AE-B4C6-C98DA3205C09}" type="datetimeFigureOut">
               <a:rPr lang="en-US"/>
-              <a:t>11/2/17</a:t>
+              <a:t>11/7/17</a:t>
             </a:fld>
             <a:endParaRPr lang="en-US"/>
           </a:p>
@@ -851,7 +851,7 @@
           <a:p>
             <a:fld id="{1D8BD707-D9CF-40AE-B4C6-C98DA3205C09}" type="datetimeFigureOut">
               <a:rPr lang="en-US"/>
-              <a:t>11/2/17</a:t>
+              <a:t>11/7/17</a:t>
             </a:fld>
             <a:endParaRPr lang="en-US"/>
           </a:p>
@@ -1088,7 +1088,7 @@
           <a:p>
             <a:fld id="{1D8BD707-D9CF-40AE-B4C6-C98DA3205C09}" type="datetimeFigureOut">
               <a:rPr lang="en-US"/>
-              <a:t>11/2/17</a:t>
+              <a:t>11/7/17</a:t>
             </a:fld>
             <a:endParaRPr lang="en-US"/>
           </a:p>
@@ -1259,7 +1259,7 @@
           <a:p>
             <a:fld id="{1D8BD707-D9CF-40AE-B4C6-C98DA3205C09}" type="datetimeFigureOut">
               <a:rPr lang="en-US"/>
-              <a:t>11/2/17</a:t>
+              <a:t>11/7/17</a:t>
             </a:fld>
             <a:endParaRPr lang="en-US"/>
           </a:p>
@@ -1401,7 +1401,7 @@
           <a:p>
             <a:fld id="{1D8BD707-D9CF-40AE-B4C6-C98DA3205C09}" type="datetimeFigureOut">
               <a:rPr lang="en-US"/>
-              <a:t>11/2/17</a:t>
+              <a:t>11/7/17</a:t>
             </a:fld>
             <a:endParaRPr lang="en-US"/>
           </a:p>
@@ -1678,7 +1678,7 @@
           <a:p>
             <a:fld id="{1D8BD707-D9CF-40AE-B4C6-C98DA3205C09}" type="datetimeFigureOut">
               <a:rPr lang="en-US"/>
-              <a:t>11/2/17</a:t>
+              <a:t>11/7/17</a:t>
             </a:fld>
             <a:endParaRPr lang="en-US"/>
           </a:p>
@@ -5290,23 +5290,7 @@
                 <a:ea typeface="Arial" charset="0"/>
                 <a:cs typeface="Arial" charset="0"/>
               </a:rPr>
-              <a:t>Проведение </a:t>
-            </a:r>
-            <a:r>
-              <a:rPr lang="ru-RU" sz="1600" spc="-10" dirty="0" smtClean="0">
-                <a:latin typeface="Arial" charset="0"/>
-                <a:ea typeface="Arial" charset="0"/>
-                <a:cs typeface="Arial" charset="0"/>
-              </a:rPr>
-              <a:t>анкетирования для выявления категорий, включаемых в </a:t>
-            </a:r>
-            <a:r>
-              <a:rPr lang="ru-RU" sz="1600" spc="-10" dirty="0" smtClean="0">
-                <a:latin typeface="Arial" charset="0"/>
-                <a:ea typeface="Arial" charset="0"/>
-                <a:cs typeface="Arial" charset="0"/>
-              </a:rPr>
-              <a:t>приложение</a:t>
+              <a:t>Проведение анкетирования для выявления категорий, включаемых в приложение</a:t>
             </a:r>
           </a:p>
           <a:p>
@@ -5535,23 +5519,7 @@
                 <a:ea typeface="Arial" charset="0"/>
                 <a:cs typeface="Arial" charset="0"/>
               </a:rPr>
-              <a:t>Получение </a:t>
-            </a:r>
-            <a:r>
-              <a:rPr lang="ru-RU" sz="1600" spc="-5" dirty="0" smtClean="0">
-                <a:latin typeface="Arial" charset="0"/>
-                <a:ea typeface="Arial" charset="0"/>
-                <a:cs typeface="Arial" charset="0"/>
-              </a:rPr>
-              <a:t>данных с носимого </a:t>
-            </a:r>
-            <a:r>
-              <a:rPr lang="ru-RU" sz="1600" spc="-5" dirty="0" smtClean="0">
-                <a:latin typeface="Arial" charset="0"/>
-                <a:ea typeface="Arial" charset="0"/>
-                <a:cs typeface="Arial" charset="0"/>
-              </a:rPr>
-              <a:t>устройства</a:t>
+              <a:t>Получение данных с носимого устройства</a:t>
             </a:r>
           </a:p>
           <a:p>
@@ -5567,12 +5535,20 @@
               </a:tabLst>
             </a:pPr>
             <a:r>
+              <a:rPr lang="ru-RU" sz="1600" spc="-5" dirty="0" smtClean="0">
+                <a:latin typeface="Arial" charset="0"/>
+                <a:ea typeface="Arial" charset="0"/>
+                <a:cs typeface="Arial" charset="0"/>
+              </a:rPr>
+              <a:t> Аналитика </a:t>
+            </a:r>
+            <a:r>
               <a:rPr lang="ru-RU" sz="1600" spc="-5" dirty="0">
                 <a:latin typeface="Arial" charset="0"/>
                 <a:ea typeface="Arial" charset="0"/>
                 <a:cs typeface="Arial" charset="0"/>
               </a:rPr>
-              <a:t>Аналитика данных </a:t>
+              <a:t>данных </a:t>
             </a:r>
             <a:r>
               <a:rPr lang="ru-RU" sz="1600" spc="-5" dirty="0" smtClean="0">
@@ -5582,11 +5558,6 @@
               </a:rPr>
               <a:t>здоровья</a:t>
             </a:r>
-            <a:endParaRPr lang="ru-RU" sz="1600" spc="-5" dirty="0" smtClean="0">
-              <a:latin typeface="Arial" charset="0"/>
-              <a:ea typeface="Arial" charset="0"/>
-              <a:cs typeface="Arial" charset="0"/>
-            </a:endParaRPr>
           </a:p>
           <a:p>
             <a:pPr marL="241300" indent="-228600">
@@ -5606,7 +5577,7 @@
                 <a:ea typeface="Arial" charset="0"/>
                 <a:cs typeface="Arial" charset="0"/>
               </a:rPr>
-              <a:t>Разработка </a:t>
+              <a:t> Разработка </a:t>
             </a:r>
             <a:r>
               <a:rPr lang="ru-RU" sz="1600" spc="-5" dirty="0" smtClean="0">
@@ -5616,11 +5587,6 @@
               </a:rPr>
               <a:t>технической документации</a:t>
             </a:r>
-            <a:endParaRPr lang="ru-RU" sz="1600" spc="-5" dirty="0" smtClean="0">
-              <a:latin typeface="Arial" charset="0"/>
-              <a:ea typeface="Arial" charset="0"/>
-              <a:cs typeface="Arial" charset="0"/>
-            </a:endParaRPr>
           </a:p>
           <a:p>
             <a:pPr marL="241300" indent="-228600">

</xml_diff>